<commit_message>
Android App looking decent
Added lots of functionality to the app on the Android side 💯
</commit_message>
<xml_diff>
--- a/StackFrame.pptx
+++ b/StackFrame.pptx
@@ -2,7 +2,7 @@
 <file path=ppt/presentation.xml><?xml version="1.0" encoding="utf-8"?>
 <p:presentation xmlns:a="http://schemas.openxmlformats.org/drawingml/2006/main" xmlns:r="http://schemas.openxmlformats.org/officeDocument/2006/relationships" xmlns:p="http://schemas.openxmlformats.org/presentationml/2006/main" saveSubsetFonts="1">
   <p:sldMasterIdLst>
-    <p:sldMasterId id="2147483648" r:id="rId1"/>
+    <p:sldMasterId id="2147483660" r:id="rId1"/>
   </p:sldMasterIdLst>
   <p:sldIdLst>
     <p:sldId id="256" r:id="rId2"/>
@@ -10,7 +10,7 @@
     <p:sldId id="258" r:id="rId4"/>
     <p:sldId id="259" r:id="rId5"/>
   </p:sldIdLst>
-  <p:sldSz cx="12192000" cy="6858000"/>
+  <p:sldSz cx="9144000" cy="6858000" type="screen4x3"/>
   <p:notesSz cx="6858000" cy="9144000"/>
   <p:defaultTextStyle>
     <a:defPPr>
@@ -139,8 +139,8 @@
         </p:nvSpPr>
         <p:spPr>
           <a:xfrm>
-            <a:off x="1524000" y="1122363"/>
-            <a:ext cx="9144000" cy="2387600"/>
+            <a:off x="685800" y="1122363"/>
+            <a:ext cx="7772400" cy="2387600"/>
           </a:xfrm>
         </p:spPr>
         <p:txBody>
@@ -155,7 +155,7 @@
               <a:rPr lang="en-US" smtClean="0"/>
               <a:t>Click to edit Master title style</a:t>
             </a:r>
-            <a:endParaRPr lang="en-US"/>
+            <a:endParaRPr lang="en-US" dirty="0"/>
           </a:p>
         </p:txBody>
       </p:sp>
@@ -171,8 +171,8 @@
         </p:nvSpPr>
         <p:spPr>
           <a:xfrm>
-            <a:off x="1524000" y="3602038"/>
-            <a:ext cx="9144000" cy="1655762"/>
+            <a:off x="1143000" y="3602038"/>
+            <a:ext cx="6858000" cy="1655762"/>
           </a:xfrm>
         </p:spPr>
         <p:txBody>
@@ -220,7 +220,7 @@
               <a:rPr lang="en-US" smtClean="0"/>
               <a:t>Click to edit Master subtitle style</a:t>
             </a:r>
-            <a:endParaRPr lang="en-US"/>
+            <a:endParaRPr lang="en-US" dirty="0"/>
           </a:p>
         </p:txBody>
       </p:sp>
@@ -292,7 +292,7 @@
     </p:spTree>
     <p:extLst>
       <p:ext uri="{BB962C8B-B14F-4D97-AF65-F5344CB8AC3E}">
-        <p14:creationId xmlns:p14="http://schemas.microsoft.com/office/powerpoint/2010/main" val="2808014512"/>
+        <p14:creationId xmlns:p14="http://schemas.microsoft.com/office/powerpoint/2010/main" val="2708925874"/>
       </p:ext>
     </p:extLst>
   </p:cSld>
@@ -338,7 +338,7 @@
               <a:rPr lang="en-US" smtClean="0"/>
               <a:t>Click to edit Master title style</a:t>
             </a:r>
-            <a:endParaRPr lang="en-US"/>
+            <a:endParaRPr lang="en-US" dirty="0"/>
           </a:p>
         </p:txBody>
       </p:sp>
@@ -390,7 +390,7 @@
               <a:rPr lang="en-US" smtClean="0"/>
               <a:t>Fifth level</a:t>
             </a:r>
-            <a:endParaRPr lang="en-US"/>
+            <a:endParaRPr lang="en-US" dirty="0"/>
           </a:p>
         </p:txBody>
       </p:sp>
@@ -462,7 +462,7 @@
     </p:spTree>
     <p:extLst>
       <p:ext uri="{BB962C8B-B14F-4D97-AF65-F5344CB8AC3E}">
-        <p14:creationId xmlns:p14="http://schemas.microsoft.com/office/powerpoint/2010/main" val="1609151854"/>
+        <p14:creationId xmlns:p14="http://schemas.microsoft.com/office/powerpoint/2010/main" val="2359015765"/>
       </p:ext>
     </p:extLst>
   </p:cSld>
@@ -501,8 +501,8 @@
         </p:nvSpPr>
         <p:spPr>
           <a:xfrm>
-            <a:off x="8724900" y="365125"/>
-            <a:ext cx="2628900" cy="5811838"/>
+            <a:off x="6543675" y="365125"/>
+            <a:ext cx="1971675" cy="5811838"/>
           </a:xfrm>
         </p:spPr>
         <p:txBody>
@@ -513,7 +513,7 @@
               <a:rPr lang="en-US" smtClean="0"/>
               <a:t>Click to edit Master title style</a:t>
             </a:r>
-            <a:endParaRPr lang="en-US"/>
+            <a:endParaRPr lang="en-US" dirty="0"/>
           </a:p>
         </p:txBody>
       </p:sp>
@@ -529,8 +529,8 @@
         </p:nvSpPr>
         <p:spPr>
           <a:xfrm>
-            <a:off x="838200" y="365125"/>
-            <a:ext cx="7734300" cy="5811838"/>
+            <a:off x="628650" y="365125"/>
+            <a:ext cx="5800725" cy="5811838"/>
           </a:xfrm>
         </p:spPr>
         <p:txBody>
@@ -570,7 +570,7 @@
               <a:rPr lang="en-US" smtClean="0"/>
               <a:t>Fifth level</a:t>
             </a:r>
-            <a:endParaRPr lang="en-US"/>
+            <a:endParaRPr lang="en-US" dirty="0"/>
           </a:p>
         </p:txBody>
       </p:sp>
@@ -642,7 +642,7 @@
     </p:spTree>
     <p:extLst>
       <p:ext uri="{BB962C8B-B14F-4D97-AF65-F5344CB8AC3E}">
-        <p14:creationId xmlns:p14="http://schemas.microsoft.com/office/powerpoint/2010/main" val="47731499"/>
+        <p14:creationId xmlns:p14="http://schemas.microsoft.com/office/powerpoint/2010/main" val="2482710159"/>
       </p:ext>
     </p:extLst>
   </p:cSld>
@@ -688,7 +688,7 @@
               <a:rPr lang="en-US" smtClean="0"/>
               <a:t>Click to edit Master title style</a:t>
             </a:r>
-            <a:endParaRPr lang="en-US"/>
+            <a:endParaRPr lang="en-US" dirty="0"/>
           </a:p>
         </p:txBody>
       </p:sp>
@@ -740,7 +740,7 @@
               <a:rPr lang="en-US" smtClean="0"/>
               <a:t>Fifth level</a:t>
             </a:r>
-            <a:endParaRPr lang="en-US"/>
+            <a:endParaRPr lang="en-US" dirty="0"/>
           </a:p>
         </p:txBody>
       </p:sp>
@@ -812,7 +812,7 @@
     </p:spTree>
     <p:extLst>
       <p:ext uri="{BB962C8B-B14F-4D97-AF65-F5344CB8AC3E}">
-        <p14:creationId xmlns:p14="http://schemas.microsoft.com/office/powerpoint/2010/main" val="2971113976"/>
+        <p14:creationId xmlns:p14="http://schemas.microsoft.com/office/powerpoint/2010/main" val="3157371148"/>
       </p:ext>
     </p:extLst>
   </p:cSld>
@@ -851,8 +851,8 @@
         </p:nvSpPr>
         <p:spPr>
           <a:xfrm>
-            <a:off x="831850" y="1709738"/>
-            <a:ext cx="10515600" cy="2852737"/>
+            <a:off x="623888" y="1709739"/>
+            <a:ext cx="7886700" cy="2852737"/>
           </a:xfrm>
         </p:spPr>
         <p:txBody>
@@ -867,7 +867,7 @@
               <a:rPr lang="en-US" smtClean="0"/>
               <a:t>Click to edit Master title style</a:t>
             </a:r>
-            <a:endParaRPr lang="en-US"/>
+            <a:endParaRPr lang="en-US" dirty="0"/>
           </a:p>
         </p:txBody>
       </p:sp>
@@ -883,8 +883,8 @@
         </p:nvSpPr>
         <p:spPr>
           <a:xfrm>
-            <a:off x="831850" y="4589463"/>
-            <a:ext cx="10515600" cy="1500187"/>
+            <a:off x="623888" y="4589464"/>
+            <a:ext cx="7886700" cy="1500187"/>
           </a:xfrm>
         </p:spPr>
         <p:txBody>
@@ -894,9 +894,7 @@
               <a:buNone/>
               <a:defRPr sz="2400">
                 <a:solidFill>
-                  <a:schemeClr val="tx1">
-                    <a:tint val="75000"/>
-                  </a:schemeClr>
+                  <a:schemeClr val="tx1"/>
                 </a:solidFill>
               </a:defRPr>
             </a:lvl1pPr>
@@ -1058,7 +1056,7 @@
     </p:spTree>
     <p:extLst>
       <p:ext uri="{BB962C8B-B14F-4D97-AF65-F5344CB8AC3E}">
-        <p14:creationId xmlns:p14="http://schemas.microsoft.com/office/powerpoint/2010/main" val="84449404"/>
+        <p14:creationId xmlns:p14="http://schemas.microsoft.com/office/powerpoint/2010/main" val="1784033187"/>
       </p:ext>
     </p:extLst>
   </p:cSld>
@@ -1104,7 +1102,7 @@
               <a:rPr lang="en-US" smtClean="0"/>
               <a:t>Click to edit Master title style</a:t>
             </a:r>
-            <a:endParaRPr lang="en-US"/>
+            <a:endParaRPr lang="en-US" dirty="0"/>
           </a:p>
         </p:txBody>
       </p:sp>
@@ -1120,8 +1118,8 @@
         </p:nvSpPr>
         <p:spPr>
           <a:xfrm>
-            <a:off x="838200" y="1825625"/>
-            <a:ext cx="5181600" cy="4351338"/>
+            <a:off x="628650" y="1825625"/>
+            <a:ext cx="3886200" cy="4351338"/>
           </a:xfrm>
         </p:spPr>
         <p:txBody>
@@ -1161,7 +1159,7 @@
               <a:rPr lang="en-US" smtClean="0"/>
               <a:t>Fifth level</a:t>
             </a:r>
-            <a:endParaRPr lang="en-US"/>
+            <a:endParaRPr lang="en-US" dirty="0"/>
           </a:p>
         </p:txBody>
       </p:sp>
@@ -1177,8 +1175,8 @@
         </p:nvSpPr>
         <p:spPr>
           <a:xfrm>
-            <a:off x="6172200" y="1825625"/>
-            <a:ext cx="5181600" cy="4351338"/>
+            <a:off x="4629150" y="1825625"/>
+            <a:ext cx="3886200" cy="4351338"/>
           </a:xfrm>
         </p:spPr>
         <p:txBody>
@@ -1218,7 +1216,7 @@
               <a:rPr lang="en-US" smtClean="0"/>
               <a:t>Fifth level</a:t>
             </a:r>
-            <a:endParaRPr lang="en-US"/>
+            <a:endParaRPr lang="en-US" dirty="0"/>
           </a:p>
         </p:txBody>
       </p:sp>
@@ -1290,7 +1288,7 @@
     </p:spTree>
     <p:extLst>
       <p:ext uri="{BB962C8B-B14F-4D97-AF65-F5344CB8AC3E}">
-        <p14:creationId xmlns:p14="http://schemas.microsoft.com/office/powerpoint/2010/main" val="1448444633"/>
+        <p14:creationId xmlns:p14="http://schemas.microsoft.com/office/powerpoint/2010/main" val="1174866359"/>
       </p:ext>
     </p:extLst>
   </p:cSld>
@@ -1329,8 +1327,8 @@
         </p:nvSpPr>
         <p:spPr>
           <a:xfrm>
-            <a:off x="839788" y="365125"/>
-            <a:ext cx="10515600" cy="1325563"/>
+            <a:off x="629841" y="365126"/>
+            <a:ext cx="7886700" cy="1325563"/>
           </a:xfrm>
         </p:spPr>
         <p:txBody>
@@ -1341,7 +1339,7 @@
               <a:rPr lang="en-US" smtClean="0"/>
               <a:t>Click to edit Master title style</a:t>
             </a:r>
-            <a:endParaRPr lang="en-US"/>
+            <a:endParaRPr lang="en-US" dirty="0"/>
           </a:p>
         </p:txBody>
       </p:sp>
@@ -1357,8 +1355,8 @@
         </p:nvSpPr>
         <p:spPr>
           <a:xfrm>
-            <a:off x="839788" y="1681163"/>
-            <a:ext cx="5157787" cy="823912"/>
+            <a:off x="629842" y="1681163"/>
+            <a:ext cx="3868340" cy="823912"/>
           </a:xfrm>
         </p:spPr>
         <p:txBody>
@@ -1422,8 +1420,8 @@
         </p:nvSpPr>
         <p:spPr>
           <a:xfrm>
-            <a:off x="839788" y="2505075"/>
-            <a:ext cx="5157787" cy="3684588"/>
+            <a:off x="629842" y="2505075"/>
+            <a:ext cx="3868340" cy="3684588"/>
           </a:xfrm>
         </p:spPr>
         <p:txBody>
@@ -1463,7 +1461,7 @@
               <a:rPr lang="en-US" smtClean="0"/>
               <a:t>Fifth level</a:t>
             </a:r>
-            <a:endParaRPr lang="en-US"/>
+            <a:endParaRPr lang="en-US" dirty="0"/>
           </a:p>
         </p:txBody>
       </p:sp>
@@ -1479,8 +1477,8 @@
         </p:nvSpPr>
         <p:spPr>
           <a:xfrm>
-            <a:off x="6172200" y="1681163"/>
-            <a:ext cx="5183188" cy="823912"/>
+            <a:off x="4629150" y="1681163"/>
+            <a:ext cx="3887391" cy="823912"/>
           </a:xfrm>
         </p:spPr>
         <p:txBody>
@@ -1544,8 +1542,8 @@
         </p:nvSpPr>
         <p:spPr>
           <a:xfrm>
-            <a:off x="6172200" y="2505075"/>
-            <a:ext cx="5183188" cy="3684588"/>
+            <a:off x="4629150" y="2505075"/>
+            <a:ext cx="3887391" cy="3684588"/>
           </a:xfrm>
         </p:spPr>
         <p:txBody>
@@ -1585,7 +1583,7 @@
               <a:rPr lang="en-US" smtClean="0"/>
               <a:t>Fifth level</a:t>
             </a:r>
-            <a:endParaRPr lang="en-US"/>
+            <a:endParaRPr lang="en-US" dirty="0"/>
           </a:p>
         </p:txBody>
       </p:sp>
@@ -1657,7 +1655,7 @@
     </p:spTree>
     <p:extLst>
       <p:ext uri="{BB962C8B-B14F-4D97-AF65-F5344CB8AC3E}">
-        <p14:creationId xmlns:p14="http://schemas.microsoft.com/office/powerpoint/2010/main" val="2340404501"/>
+        <p14:creationId xmlns:p14="http://schemas.microsoft.com/office/powerpoint/2010/main" val="2058339260"/>
       </p:ext>
     </p:extLst>
   </p:cSld>
@@ -1703,7 +1701,7 @@
               <a:rPr lang="en-US" smtClean="0"/>
               <a:t>Click to edit Master title style</a:t>
             </a:r>
-            <a:endParaRPr lang="en-US"/>
+            <a:endParaRPr lang="en-US" dirty="0"/>
           </a:p>
         </p:txBody>
       </p:sp>
@@ -1775,7 +1773,7 @@
     </p:spTree>
     <p:extLst>
       <p:ext uri="{BB962C8B-B14F-4D97-AF65-F5344CB8AC3E}">
-        <p14:creationId xmlns:p14="http://schemas.microsoft.com/office/powerpoint/2010/main" val="2640896619"/>
+        <p14:creationId xmlns:p14="http://schemas.microsoft.com/office/powerpoint/2010/main" val="757089035"/>
       </p:ext>
     </p:extLst>
   </p:cSld>
@@ -1870,7 +1868,7 @@
     </p:spTree>
     <p:extLst>
       <p:ext uri="{BB962C8B-B14F-4D97-AF65-F5344CB8AC3E}">
-        <p14:creationId xmlns:p14="http://schemas.microsoft.com/office/powerpoint/2010/main" val="833920740"/>
+        <p14:creationId xmlns:p14="http://schemas.microsoft.com/office/powerpoint/2010/main" val="720002908"/>
       </p:ext>
     </p:extLst>
   </p:cSld>
@@ -1909,8 +1907,8 @@
         </p:nvSpPr>
         <p:spPr>
           <a:xfrm>
-            <a:off x="839788" y="457200"/>
-            <a:ext cx="3932237" cy="1600200"/>
+            <a:off x="629841" y="457200"/>
+            <a:ext cx="2949178" cy="1600200"/>
           </a:xfrm>
         </p:spPr>
         <p:txBody>
@@ -1925,7 +1923,7 @@
               <a:rPr lang="en-US" smtClean="0"/>
               <a:t>Click to edit Master title style</a:t>
             </a:r>
-            <a:endParaRPr lang="en-US"/>
+            <a:endParaRPr lang="en-US" dirty="0"/>
           </a:p>
         </p:txBody>
       </p:sp>
@@ -1941,8 +1939,8 @@
         </p:nvSpPr>
         <p:spPr>
           <a:xfrm>
-            <a:off x="5183188" y="987425"/>
-            <a:ext cx="6172200" cy="4873625"/>
+            <a:off x="3887391" y="987426"/>
+            <a:ext cx="4629150" cy="4873625"/>
           </a:xfrm>
         </p:spPr>
         <p:txBody>
@@ -2010,7 +2008,7 @@
               <a:rPr lang="en-US" smtClean="0"/>
               <a:t>Fifth level</a:t>
             </a:r>
-            <a:endParaRPr lang="en-US"/>
+            <a:endParaRPr lang="en-US" dirty="0"/>
           </a:p>
         </p:txBody>
       </p:sp>
@@ -2026,8 +2024,8 @@
         </p:nvSpPr>
         <p:spPr>
           <a:xfrm>
-            <a:off x="839788" y="2057400"/>
-            <a:ext cx="3932237" cy="3811588"/>
+            <a:off x="629841" y="2057400"/>
+            <a:ext cx="2949178" cy="3811588"/>
           </a:xfrm>
         </p:spPr>
         <p:txBody>
@@ -2147,7 +2145,7 @@
     </p:spTree>
     <p:extLst>
       <p:ext uri="{BB962C8B-B14F-4D97-AF65-F5344CB8AC3E}">
-        <p14:creationId xmlns:p14="http://schemas.microsoft.com/office/powerpoint/2010/main" val="874658038"/>
+        <p14:creationId xmlns:p14="http://schemas.microsoft.com/office/powerpoint/2010/main" val="1415760514"/>
       </p:ext>
     </p:extLst>
   </p:cSld>
@@ -2186,8 +2184,8 @@
         </p:nvSpPr>
         <p:spPr>
           <a:xfrm>
-            <a:off x="839788" y="457200"/>
-            <a:ext cx="3932237" cy="1600200"/>
+            <a:off x="629841" y="457200"/>
+            <a:ext cx="2949178" cy="1600200"/>
           </a:xfrm>
         </p:spPr>
         <p:txBody>
@@ -2202,7 +2200,7 @@
               <a:rPr lang="en-US" smtClean="0"/>
               <a:t>Click to edit Master title style</a:t>
             </a:r>
-            <a:endParaRPr lang="en-US"/>
+            <a:endParaRPr lang="en-US" dirty="0"/>
           </a:p>
         </p:txBody>
       </p:sp>
@@ -2210,7 +2208,7 @@
         <p:nvSpPr>
           <p:cNvPr id="3" name="Picture Placeholder 2"/>
           <p:cNvSpPr>
-            <a:spLocks noGrp="1"/>
+            <a:spLocks noGrp="1" noChangeAspect="1"/>
           </p:cNvSpPr>
           <p:nvPr>
             <p:ph type="pic" idx="1"/>
@@ -2218,12 +2216,12 @@
         </p:nvSpPr>
         <p:spPr>
           <a:xfrm>
-            <a:off x="5183188" y="987425"/>
-            <a:ext cx="6172200" cy="4873625"/>
+            <a:off x="3887391" y="987426"/>
+            <a:ext cx="4629150" cy="4873625"/>
           </a:xfrm>
         </p:spPr>
         <p:txBody>
-          <a:bodyPr/>
+          <a:bodyPr anchor="t"/>
           <a:lstStyle>
             <a:lvl1pPr marL="0" indent="0">
               <a:buNone/>
@@ -2263,7 +2261,11 @@
             </a:lvl9pPr>
           </a:lstStyle>
           <a:p>
-            <a:endParaRPr lang="en-US"/>
+            <a:r>
+              <a:rPr lang="en-US" smtClean="0"/>
+              <a:t>Click icon to add picture</a:t>
+            </a:r>
+            <a:endParaRPr lang="en-US" dirty="0"/>
           </a:p>
         </p:txBody>
       </p:sp>
@@ -2279,8 +2281,8 @@
         </p:nvSpPr>
         <p:spPr>
           <a:xfrm>
-            <a:off x="839788" y="2057400"/>
-            <a:ext cx="3932237" cy="3811588"/>
+            <a:off x="629841" y="2057400"/>
+            <a:ext cx="2949178" cy="3811588"/>
           </a:xfrm>
         </p:spPr>
         <p:txBody>
@@ -2400,7 +2402,7 @@
     </p:spTree>
     <p:extLst>
       <p:ext uri="{BB962C8B-B14F-4D97-AF65-F5344CB8AC3E}">
-        <p14:creationId xmlns:p14="http://schemas.microsoft.com/office/powerpoint/2010/main" val="2503115612"/>
+        <p14:creationId xmlns:p14="http://schemas.microsoft.com/office/powerpoint/2010/main" val="2392062430"/>
       </p:ext>
     </p:extLst>
   </p:cSld>
@@ -2415,33 +2417,15 @@
   <p:cSld>
     <p:bg>
       <p:bgPr>
-        <a:gradFill flip="none" rotWithShape="1">
-          <a:gsLst>
-            <a:gs pos="0">
-              <a:srgbClr val="00BCD4"/>
-            </a:gs>
-            <a:gs pos="71000">
-              <a:schemeClr val="accent1">
-                <a:lumMod val="45000"/>
-                <a:lumOff val="55000"/>
-              </a:schemeClr>
-            </a:gs>
-            <a:gs pos="81000">
-              <a:schemeClr val="accent1">
-                <a:lumMod val="45000"/>
-                <a:lumOff val="55000"/>
-              </a:schemeClr>
-            </a:gs>
-            <a:gs pos="100000">
-              <a:schemeClr val="accent1">
-                <a:lumMod val="30000"/>
-                <a:lumOff val="70000"/>
-              </a:schemeClr>
-            </a:gs>
-          </a:gsLst>
-          <a:lin ang="5400000" scaled="1"/>
-          <a:tileRect/>
-        </a:gradFill>
+        <a:blipFill dpi="0" rotWithShape="1">
+          <a:blip r:embed="rId13">
+            <a:lum/>
+          </a:blip>
+          <a:srcRect/>
+          <a:stretch>
+            <a:fillRect l="-26000" r="-17000"/>
+          </a:stretch>
+        </a:blipFill>
         <a:effectLst/>
       </p:bgPr>
     </p:bg>
@@ -2471,8 +2455,8 @@
         </p:nvSpPr>
         <p:spPr>
           <a:xfrm>
-            <a:off x="838200" y="365125"/>
-            <a:ext cx="10515600" cy="1325563"/>
+            <a:off x="628650" y="365126"/>
+            <a:ext cx="7886700" cy="1325563"/>
           </a:xfrm>
           <a:prstGeom prst="rect">
             <a:avLst/>
@@ -2488,7 +2472,7 @@
               <a:rPr lang="en-US" smtClean="0"/>
               <a:t>Click to edit Master title style</a:t>
             </a:r>
-            <a:endParaRPr lang="en-US"/>
+            <a:endParaRPr lang="en-US" dirty="0"/>
           </a:p>
         </p:txBody>
       </p:sp>
@@ -2504,8 +2488,8 @@
         </p:nvSpPr>
         <p:spPr>
           <a:xfrm>
-            <a:off x="838200" y="1825625"/>
-            <a:ext cx="10515600" cy="4351338"/>
+            <a:off x="628650" y="1825625"/>
+            <a:ext cx="7886700" cy="4351338"/>
           </a:xfrm>
           <a:prstGeom prst="rect">
             <a:avLst/>
@@ -2550,7 +2534,7 @@
               <a:rPr lang="en-US" smtClean="0"/>
               <a:t>Fifth level</a:t>
             </a:r>
-            <a:endParaRPr lang="en-US"/>
+            <a:endParaRPr lang="en-US" dirty="0"/>
           </a:p>
         </p:txBody>
       </p:sp>
@@ -2566,8 +2550,8 @@
         </p:nvSpPr>
         <p:spPr>
           <a:xfrm>
-            <a:off x="838200" y="6356350"/>
-            <a:ext cx="2743200" cy="365125"/>
+            <a:off x="628650" y="6356351"/>
+            <a:ext cx="2057400" cy="365125"/>
           </a:xfrm>
           <a:prstGeom prst="rect">
             <a:avLst/>
@@ -2607,8 +2591,8 @@
         </p:nvSpPr>
         <p:spPr>
           <a:xfrm>
-            <a:off x="4038600" y="6356350"/>
-            <a:ext cx="4114800" cy="365125"/>
+            <a:off x="3028950" y="6356351"/>
+            <a:ext cx="3086100" cy="365125"/>
           </a:xfrm>
           <a:prstGeom prst="rect">
             <a:avLst/>
@@ -2644,8 +2628,8 @@
         </p:nvSpPr>
         <p:spPr>
           <a:xfrm>
-            <a:off x="8610600" y="6356350"/>
-            <a:ext cx="2743200" cy="365125"/>
+            <a:off x="6457950" y="6356351"/>
+            <a:ext cx="2057400" cy="365125"/>
           </a:xfrm>
           <a:prstGeom prst="rect">
             <a:avLst/>
@@ -2676,23 +2660,23 @@
     </p:spTree>
     <p:extLst>
       <p:ext uri="{BB962C8B-B14F-4D97-AF65-F5344CB8AC3E}">
-        <p14:creationId xmlns:p14="http://schemas.microsoft.com/office/powerpoint/2010/main" val="2324307376"/>
+        <p14:creationId xmlns:p14="http://schemas.microsoft.com/office/powerpoint/2010/main" val="1883050116"/>
       </p:ext>
     </p:extLst>
   </p:cSld>
   <p:clrMap bg1="lt1" tx1="dk1" bg2="lt2" tx2="dk2" accent1="accent1" accent2="accent2" accent3="accent3" accent4="accent4" accent5="accent5" accent6="accent6" hlink="hlink" folHlink="folHlink"/>
   <p:sldLayoutIdLst>
-    <p:sldLayoutId id="2147483649" r:id="rId1"/>
-    <p:sldLayoutId id="2147483650" r:id="rId2"/>
-    <p:sldLayoutId id="2147483651" r:id="rId3"/>
-    <p:sldLayoutId id="2147483652" r:id="rId4"/>
-    <p:sldLayoutId id="2147483653" r:id="rId5"/>
-    <p:sldLayoutId id="2147483654" r:id="rId6"/>
-    <p:sldLayoutId id="2147483655" r:id="rId7"/>
-    <p:sldLayoutId id="2147483656" r:id="rId8"/>
-    <p:sldLayoutId id="2147483657" r:id="rId9"/>
-    <p:sldLayoutId id="2147483658" r:id="rId10"/>
-    <p:sldLayoutId id="2147483659" r:id="rId11"/>
+    <p:sldLayoutId id="2147483661" r:id="rId1"/>
+    <p:sldLayoutId id="2147483662" r:id="rId2"/>
+    <p:sldLayoutId id="2147483663" r:id="rId3"/>
+    <p:sldLayoutId id="2147483664" r:id="rId4"/>
+    <p:sldLayoutId id="2147483665" r:id="rId5"/>
+    <p:sldLayoutId id="2147483666" r:id="rId6"/>
+    <p:sldLayoutId id="2147483667" r:id="rId7"/>
+    <p:sldLayoutId id="2147483668" r:id="rId8"/>
+    <p:sldLayoutId id="2147483669" r:id="rId9"/>
+    <p:sldLayoutId id="2147483670" r:id="rId10"/>
+    <p:sldLayoutId id="2147483671" r:id="rId11"/>
   </p:sldLayoutIdLst>
   <p:txStyles>
     <p:titleStyle>
@@ -3004,18 +2988,45 @@
             <p:ph type="ctrTitle"/>
           </p:nvPr>
         </p:nvSpPr>
-        <p:spPr/>
-        <p:txBody>
-          <a:bodyPr/>
+        <p:spPr>
+          <a:xfrm>
+            <a:off x="0" y="2283278"/>
+            <a:ext cx="5192486" cy="1064930"/>
+          </a:xfrm>
+        </p:spPr>
+        <p:txBody>
+          <a:bodyPr>
+            <a:normAutofit fontScale="90000"/>
+          </a:bodyPr>
           <a:lstStyle/>
           <a:p>
             <a:r>
               <a:rPr lang="en-US" dirty="0" err="1" smtClean="0">
+                <a:solidFill>
+                  <a:schemeClr val="bg1"/>
+                </a:solidFill>
+                <a:effectLst>
+                  <a:outerShdw blurRad="38100" dist="38100" dir="2700000" algn="tl">
+                    <a:srgbClr val="000000">
+                      <a:alpha val="43137"/>
+                    </a:srgbClr>
+                  </a:outerShdw>
+                </a:effectLst>
                 <a:latin typeface="Orbitron" panose="02000000000000000000" pitchFamily="2" charset="0"/>
               </a:rPr>
               <a:t>StackFrame</a:t>
             </a:r>
             <a:endParaRPr lang="en-US" dirty="0">
+              <a:solidFill>
+                <a:schemeClr val="bg1"/>
+              </a:solidFill>
+              <a:effectLst>
+                <a:outerShdw blurRad="38100" dist="38100" dir="2700000" algn="tl">
+                  <a:srgbClr val="000000">
+                    <a:alpha val="43137"/>
+                  </a:srgbClr>
+                </a:outerShdw>
+              </a:effectLst>
               <a:latin typeface="Orbitron" panose="02000000000000000000" pitchFamily="2" charset="0"/>
             </a:endParaRPr>
           </a:p>
@@ -3031,20 +3042,58 @@
             <p:ph type="subTitle" idx="1"/>
           </p:nvPr>
         </p:nvSpPr>
-        <p:spPr/>
-        <p:txBody>
-          <a:bodyPr/>
-          <a:lstStyle/>
-          <a:p>
-            <a:r>
-              <a:rPr lang="en-US" dirty="0" smtClean="0"/>
+        <p:spPr>
+          <a:xfrm>
+            <a:off x="522514" y="3348208"/>
+            <a:ext cx="6858000" cy="1241822"/>
+          </a:xfrm>
+        </p:spPr>
+        <p:txBody>
+          <a:bodyPr/>
+          <a:lstStyle/>
+          <a:p>
+            <a:r>
+              <a:rPr lang="en-US" dirty="0" smtClean="0">
+                <a:solidFill>
+                  <a:schemeClr val="bg1"/>
+                </a:solidFill>
+                <a:effectLst>
+                  <a:outerShdw blurRad="38100" dist="38100" dir="2700000" algn="tl">
+                    <a:srgbClr val="000000">
+                      <a:alpha val="43137"/>
+                    </a:srgbClr>
+                  </a:outerShdw>
+                </a:effectLst>
+              </a:rPr>
               <a:t>Desone Burns II, Bryce Hammond, Josh McCloskey, Stephen </a:t>
             </a:r>
             <a:r>
-              <a:rPr lang="en-US" dirty="0" err="1" smtClean="0"/>
+              <a:rPr lang="en-US" dirty="0" err="1" smtClean="0">
+                <a:solidFill>
+                  <a:schemeClr val="bg1"/>
+                </a:solidFill>
+                <a:effectLst>
+                  <a:outerShdw blurRad="38100" dist="38100" dir="2700000" algn="tl">
+                    <a:srgbClr val="000000">
+                      <a:alpha val="43137"/>
+                    </a:srgbClr>
+                  </a:outerShdw>
+                </a:effectLst>
+              </a:rPr>
               <a:t>Varjabedian</a:t>
             </a:r>
-            <a:endParaRPr lang="en-US" dirty="0"/>
+            <a:endParaRPr lang="en-US" dirty="0">
+              <a:solidFill>
+                <a:schemeClr val="bg1"/>
+              </a:solidFill>
+              <a:effectLst>
+                <a:outerShdw blurRad="38100" dist="38100" dir="2700000" algn="tl">
+                  <a:srgbClr val="000000">
+                    <a:alpha val="43137"/>
+                  </a:srgbClr>
+                </a:outerShdw>
+              </a:effectLst>
+            </a:endParaRPr>
           </a:p>
         </p:txBody>
       </p:sp>
@@ -3058,6 +3107,16 @@
   <p:clrMapOvr>
     <a:masterClrMapping/>
   </p:clrMapOvr>
+  <p:transition spd="slow">
+    <p:push dir="u"/>
+  </p:transition>
+  <p:timing>
+    <p:tnLst>
+      <p:par>
+        <p:cTn id="1" dur="indefinite" restart="never" nodeType="tmRoot"/>
+      </p:par>
+    </p:tnLst>
+  </p:timing>
 </p:sld>
 </file>
 
@@ -3088,18 +3147,43 @@
             <p:ph type="title"/>
           </p:nvPr>
         </p:nvSpPr>
-        <p:spPr/>
+        <p:spPr>
+          <a:xfrm>
+            <a:off x="238125" y="1159669"/>
+            <a:ext cx="7886700" cy="994172"/>
+          </a:xfrm>
+        </p:spPr>
         <p:txBody>
           <a:bodyPr/>
           <a:lstStyle/>
           <a:p>
             <a:r>
               <a:rPr lang="en-US" dirty="0" smtClean="0">
+                <a:solidFill>
+                  <a:schemeClr val="bg1"/>
+                </a:solidFill>
+                <a:effectLst>
+                  <a:outerShdw blurRad="38100" dist="38100" dir="2700000" algn="tl">
+                    <a:srgbClr val="000000">
+                      <a:alpha val="43137"/>
+                    </a:srgbClr>
+                  </a:outerShdw>
+                </a:effectLst>
                 <a:latin typeface="Orbitron" panose="02000000000000000000" pitchFamily="2" charset="0"/>
               </a:rPr>
               <a:t>Overview</a:t>
             </a:r>
             <a:endParaRPr lang="en-US" dirty="0">
+              <a:solidFill>
+                <a:schemeClr val="bg1"/>
+              </a:solidFill>
+              <a:effectLst>
+                <a:outerShdw blurRad="38100" dist="38100" dir="2700000" algn="tl">
+                  <a:srgbClr val="000000">
+                    <a:alpha val="43137"/>
+                  </a:srgbClr>
+                </a:outerShdw>
+              </a:effectLst>
               <a:latin typeface="Orbitron" panose="02000000000000000000" pitchFamily="2" charset="0"/>
             </a:endParaRPr>
           </a:p>
@@ -3115,29 +3199,77 @@
             <p:ph idx="1"/>
           </p:nvPr>
         </p:nvSpPr>
-        <p:spPr/>
-        <p:txBody>
-          <a:bodyPr/>
-          <a:lstStyle/>
-          <a:p>
-            <a:r>
-              <a:rPr lang="en-US" dirty="0" smtClean="0"/>
+        <p:spPr>
+          <a:xfrm>
+            <a:off x="238125" y="2153842"/>
+            <a:ext cx="7886700" cy="3263504"/>
+          </a:xfrm>
+        </p:spPr>
+        <p:txBody>
+          <a:bodyPr>
+            <a:normAutofit fontScale="92500" lnSpcReduction="10000"/>
+          </a:bodyPr>
+          <a:lstStyle/>
+          <a:p>
+            <a:r>
+              <a:rPr lang="en-US" dirty="0" smtClean="0">
+                <a:solidFill>
+                  <a:schemeClr val="bg1"/>
+                </a:solidFill>
+                <a:effectLst>
+                  <a:outerShdw blurRad="38100" dist="38100" dir="2700000" algn="tl">
+                    <a:srgbClr val="000000">
+                      <a:alpha val="43137"/>
+                    </a:srgbClr>
+                  </a:outerShdw>
+                </a:effectLst>
+              </a:rPr>
               <a:t>Mobile social media application made to create a live and dynamic virtual community in which users can interact anonymously with users using location-based chat rooms </a:t>
             </a:r>
             <a:r>
               <a:rPr lang="en-US" dirty="0" smtClean="0">
+                <a:solidFill>
+                  <a:schemeClr val="bg1"/>
+                </a:solidFill>
+                <a:effectLst>
+                  <a:outerShdw blurRad="38100" dist="38100" dir="2700000" algn="tl">
+                    <a:srgbClr val="000000">
+                      <a:alpha val="43137"/>
+                    </a:srgbClr>
+                  </a:outerShdw>
+                </a:effectLst>
                 <a:latin typeface="Orbitron" panose="02000000000000000000" pitchFamily="2" charset="0"/>
               </a:rPr>
               <a:t>(</a:t>
             </a:r>
             <a:r>
               <a:rPr lang="en-US" dirty="0" err="1" smtClean="0">
+                <a:solidFill>
+                  <a:schemeClr val="bg1"/>
+                </a:solidFill>
+                <a:effectLst>
+                  <a:outerShdw blurRad="38100" dist="38100" dir="2700000" algn="tl">
+                    <a:srgbClr val="000000">
+                      <a:alpha val="43137"/>
+                    </a:srgbClr>
+                  </a:outerShdw>
+                </a:effectLst>
                 <a:latin typeface="Orbitron" panose="02000000000000000000" pitchFamily="2" charset="0"/>
               </a:rPr>
               <a:t>StackFrames</a:t>
             </a:r>
             <a:r>
               <a:rPr lang="en-US" dirty="0" smtClean="0">
+                <a:solidFill>
+                  <a:schemeClr val="bg1"/>
+                </a:solidFill>
+                <a:effectLst>
+                  <a:outerShdw blurRad="38100" dist="38100" dir="2700000" algn="tl">
+                    <a:srgbClr val="000000">
+                      <a:alpha val="43137"/>
+                    </a:srgbClr>
+                  </a:outerShdw>
+                </a:effectLst>
                 <a:latin typeface="Orbitron" panose="02000000000000000000" pitchFamily="2" charset="0"/>
               </a:rPr>
               <a:t>).</a:t>
@@ -3145,22 +3277,64 @@
           </a:p>
           <a:p>
             <a:endParaRPr lang="en-US" dirty="0">
+              <a:solidFill>
+                <a:schemeClr val="bg1"/>
+              </a:solidFill>
+              <a:effectLst>
+                <a:outerShdw blurRad="38100" dist="38100" dir="2700000" algn="tl">
+                  <a:srgbClr val="000000">
+                    <a:alpha val="43137"/>
+                  </a:srgbClr>
+                </a:outerShdw>
+              </a:effectLst>
               <a:latin typeface="Orbitron" panose="02000000000000000000" pitchFamily="2" charset="0"/>
             </a:endParaRPr>
           </a:p>
           <a:p>
             <a:r>
-              <a:rPr lang="en-US" dirty="0" smtClean="0"/>
+              <a:rPr lang="en-US" dirty="0" smtClean="0">
+                <a:solidFill>
+                  <a:schemeClr val="bg1"/>
+                </a:solidFill>
+                <a:effectLst>
+                  <a:outerShdw blurRad="38100" dist="38100" dir="2700000" algn="tl">
+                    <a:srgbClr val="000000">
+                      <a:alpha val="43137"/>
+                    </a:srgbClr>
+                  </a:outerShdw>
+                </a:effectLst>
+              </a:rPr>
               <a:t>Users can </a:t>
             </a:r>
             <a:r>
               <a:rPr lang="en-US" dirty="0" smtClean="0">
+                <a:solidFill>
+                  <a:schemeClr val="bg1"/>
+                </a:solidFill>
+                <a:effectLst>
+                  <a:outerShdw blurRad="38100" dist="38100" dir="2700000" algn="tl">
+                    <a:srgbClr val="000000">
+                      <a:alpha val="43137"/>
+                    </a:srgbClr>
+                  </a:outerShdw>
+                </a:effectLst>
                 <a:latin typeface="Orbitron" panose="02000000000000000000" pitchFamily="2" charset="0"/>
               </a:rPr>
               <a:t>“push” </a:t>
             </a:r>
             <a:r>
-              <a:rPr lang="en-US" dirty="0" smtClean="0"/>
+              <a:rPr lang="en-US" dirty="0" smtClean="0">
+                <a:solidFill>
+                  <a:schemeClr val="bg1"/>
+                </a:solidFill>
+                <a:effectLst>
+                  <a:outerShdw blurRad="38100" dist="38100" dir="2700000" algn="tl">
+                    <a:srgbClr val="000000">
+                      <a:alpha val="43137"/>
+                    </a:srgbClr>
+                  </a:outerShdw>
+                </a:effectLst>
+              </a:rPr>
               <a:t>three types of content:</a:t>
             </a:r>
           </a:p>
@@ -3168,6 +3342,16 @@
             <a:pPr lvl="1"/>
             <a:r>
               <a:rPr lang="en-US" dirty="0" smtClean="0">
+                <a:solidFill>
+                  <a:schemeClr val="bg1"/>
+                </a:solidFill>
+                <a:effectLst>
+                  <a:outerShdw blurRad="38100" dist="38100" dir="2700000" algn="tl">
+                    <a:srgbClr val="000000">
+                      <a:alpha val="43137"/>
+                    </a:srgbClr>
+                  </a:outerShdw>
+                </a:effectLst>
                 <a:latin typeface="Orbitron" panose="02000000000000000000" pitchFamily="2" charset="0"/>
               </a:rPr>
               <a:t>“Strings”</a:t>
@@ -3176,20 +3360,64 @@
           <a:p>
             <a:pPr lvl="1"/>
             <a:r>
-              <a:rPr lang="en-US" dirty="0" smtClean="0"/>
+              <a:rPr lang="en-US" dirty="0" smtClean="0">
+                <a:solidFill>
+                  <a:schemeClr val="bg1"/>
+                </a:solidFill>
+                <a:effectLst>
+                  <a:outerShdw blurRad="38100" dist="38100" dir="2700000" algn="tl">
+                    <a:srgbClr val="000000">
+                      <a:alpha val="43137"/>
+                    </a:srgbClr>
+                  </a:outerShdw>
+                </a:effectLst>
+              </a:rPr>
               <a:t>Pictures</a:t>
             </a:r>
           </a:p>
           <a:p>
             <a:pPr lvl="1"/>
             <a:r>
-              <a:rPr lang="en-US" dirty="0" smtClean="0"/>
+              <a:rPr lang="en-US" dirty="0" smtClean="0">
+                <a:solidFill>
+                  <a:schemeClr val="bg1"/>
+                </a:solidFill>
+                <a:effectLst>
+                  <a:outerShdw blurRad="38100" dist="38100" dir="2700000" algn="tl">
+                    <a:srgbClr val="000000">
+                      <a:alpha val="43137"/>
+                    </a:srgbClr>
+                  </a:outerShdw>
+                </a:effectLst>
+              </a:rPr>
               <a:t>Videos</a:t>
             </a:r>
-            <a:endParaRPr lang="en-US" dirty="0"/>
-          </a:p>
-          <a:p>
-            <a:endParaRPr lang="en-US" dirty="0"/>
+            <a:endParaRPr lang="en-US" dirty="0">
+              <a:solidFill>
+                <a:schemeClr val="bg1"/>
+              </a:solidFill>
+              <a:effectLst>
+                <a:outerShdw blurRad="38100" dist="38100" dir="2700000" algn="tl">
+                  <a:srgbClr val="000000">
+                    <a:alpha val="43137"/>
+                  </a:srgbClr>
+                </a:outerShdw>
+              </a:effectLst>
+            </a:endParaRPr>
+          </a:p>
+          <a:p>
+            <a:endParaRPr lang="en-US" dirty="0">
+              <a:solidFill>
+                <a:schemeClr val="bg1"/>
+              </a:solidFill>
+              <a:effectLst>
+                <a:outerShdw blurRad="38100" dist="38100" dir="2700000" algn="tl">
+                  <a:srgbClr val="000000">
+                    <a:alpha val="43137"/>
+                  </a:srgbClr>
+                </a:outerShdw>
+              </a:effectLst>
+            </a:endParaRPr>
           </a:p>
         </p:txBody>
       </p:sp>
@@ -3203,6 +3431,16 @@
   <p:clrMapOvr>
     <a:masterClrMapping/>
   </p:clrMapOvr>
+  <p:transition spd="slow">
+    <p:push dir="u"/>
+  </p:transition>
+  <p:timing>
+    <p:tnLst>
+      <p:par>
+        <p:cTn id="1" dur="indefinite" restart="never" nodeType="tmRoot"/>
+      </p:par>
+    </p:tnLst>
+  </p:timing>
 </p:sld>
 </file>
 
@@ -3233,16 +3471,45 @@
             <p:ph type="title"/>
           </p:nvPr>
         </p:nvSpPr>
-        <p:spPr/>
-        <p:txBody>
-          <a:bodyPr/>
-          <a:lstStyle/>
-          <a:p>
-            <a:r>
-              <a:rPr lang="en-US" dirty="0" smtClean="0"/>
+        <p:spPr>
+          <a:xfrm>
+            <a:off x="304800" y="1350169"/>
+            <a:ext cx="7886700" cy="994172"/>
+          </a:xfrm>
+        </p:spPr>
+        <p:txBody>
+          <a:bodyPr/>
+          <a:lstStyle/>
+          <a:p>
+            <a:r>
+              <a:rPr lang="en-US" dirty="0" smtClean="0">
+                <a:solidFill>
+                  <a:schemeClr val="bg1"/>
+                </a:solidFill>
+                <a:effectLst>
+                  <a:outerShdw blurRad="38100" dist="38100" dir="2700000" algn="tl">
+                    <a:srgbClr val="000000">
+                      <a:alpha val="43137"/>
+                    </a:srgbClr>
+                  </a:outerShdw>
+                </a:effectLst>
+                <a:latin typeface="Orbitron" panose="02000000000000000000" pitchFamily="2" charset="0"/>
+              </a:rPr>
               <a:t>User Experience</a:t>
             </a:r>
-            <a:endParaRPr lang="en-US" dirty="0"/>
+            <a:endParaRPr lang="en-US" dirty="0">
+              <a:solidFill>
+                <a:schemeClr val="bg1"/>
+              </a:solidFill>
+              <a:effectLst>
+                <a:outerShdw blurRad="38100" dist="38100" dir="2700000" algn="tl">
+                  <a:srgbClr val="000000">
+                    <a:alpha val="43137"/>
+                  </a:srgbClr>
+                </a:outerShdw>
+              </a:effectLst>
+              <a:latin typeface="Orbitron" panose="02000000000000000000" pitchFamily="2" charset="0"/>
+            </a:endParaRPr>
           </a:p>
         </p:txBody>
       </p:sp>
@@ -3256,70 +3523,229 @@
             <p:ph idx="1"/>
           </p:nvPr>
         </p:nvSpPr>
-        <p:spPr/>
-        <p:txBody>
-          <a:bodyPr/>
-          <a:lstStyle/>
-          <a:p>
-            <a:r>
-              <a:rPr lang="en-US" dirty="0" smtClean="0"/>
+        <p:spPr>
+          <a:xfrm>
+            <a:off x="304800" y="2512219"/>
+            <a:ext cx="7886700" cy="3263504"/>
+          </a:xfrm>
+        </p:spPr>
+        <p:txBody>
+          <a:bodyPr>
+            <a:normAutofit fontScale="92500" lnSpcReduction="20000"/>
+          </a:bodyPr>
+          <a:lstStyle/>
+          <a:p>
+            <a:r>
+              <a:rPr lang="en-US" dirty="0" smtClean="0">
+                <a:solidFill>
+                  <a:schemeClr val="bg1"/>
+                </a:solidFill>
+                <a:effectLst>
+                  <a:outerShdw blurRad="38100" dist="38100" dir="2700000" algn="tl">
+                    <a:srgbClr val="000000">
+                      <a:alpha val="43137"/>
+                    </a:srgbClr>
+                  </a:outerShdw>
+                </a:effectLst>
+              </a:rPr>
               <a:t>User launches app, is placed in a geo-based chat room with surrounding users.</a:t>
             </a:r>
           </a:p>
           <a:p>
-            <a:endParaRPr lang="en-US" dirty="0" smtClean="0"/>
-          </a:p>
-          <a:p>
-            <a:r>
-              <a:rPr lang="en-US" dirty="0" smtClean="0"/>
+            <a:endParaRPr lang="en-US" dirty="0" smtClean="0">
+              <a:solidFill>
+                <a:schemeClr val="bg1"/>
+              </a:solidFill>
+              <a:effectLst>
+                <a:outerShdw blurRad="38100" dist="38100" dir="2700000" algn="tl">
+                  <a:srgbClr val="000000">
+                    <a:alpha val="43137"/>
+                  </a:srgbClr>
+                </a:outerShdw>
+              </a:effectLst>
+            </a:endParaRPr>
+          </a:p>
+          <a:p>
+            <a:r>
+              <a:rPr lang="en-US" dirty="0" smtClean="0">
+                <a:solidFill>
+                  <a:schemeClr val="bg1"/>
+                </a:solidFill>
+                <a:effectLst>
+                  <a:outerShdw blurRad="38100" dist="38100" dir="2700000" algn="tl">
+                    <a:srgbClr val="000000">
+                      <a:alpha val="43137"/>
+                    </a:srgbClr>
+                  </a:outerShdw>
+                </a:effectLst>
+              </a:rPr>
               <a:t>Users can </a:t>
             </a:r>
             <a:r>
-              <a:rPr lang="en-US" dirty="0" err="1" smtClean="0"/>
+              <a:rPr lang="en-US" dirty="0" err="1" smtClean="0">
+                <a:solidFill>
+                  <a:schemeClr val="bg1"/>
+                </a:solidFill>
+                <a:effectLst>
+                  <a:outerShdw blurRad="38100" dist="38100" dir="2700000" algn="tl">
+                    <a:srgbClr val="000000">
+                      <a:alpha val="43137"/>
+                    </a:srgbClr>
+                  </a:outerShdw>
+                </a:effectLst>
+              </a:rPr>
               <a:t>upvote</a:t>
             </a:r>
             <a:r>
-              <a:rPr lang="en-US" dirty="0" smtClean="0"/>
+              <a:rPr lang="en-US" dirty="0" smtClean="0">
+                <a:solidFill>
+                  <a:schemeClr val="bg1"/>
+                </a:solidFill>
+                <a:effectLst>
+                  <a:outerShdw blurRad="38100" dist="38100" dir="2700000" algn="tl">
+                    <a:srgbClr val="000000">
+                      <a:alpha val="43137"/>
+                    </a:srgbClr>
+                  </a:outerShdw>
+                </a:effectLst>
+              </a:rPr>
               <a:t>/</a:t>
             </a:r>
             <a:r>
-              <a:rPr lang="en-US" dirty="0" err="1" smtClean="0"/>
+              <a:rPr lang="en-US" dirty="0" err="1" smtClean="0">
+                <a:solidFill>
+                  <a:schemeClr val="bg1"/>
+                </a:solidFill>
+                <a:effectLst>
+                  <a:outerShdw blurRad="38100" dist="38100" dir="2700000" algn="tl">
+                    <a:srgbClr val="000000">
+                      <a:alpha val="43137"/>
+                    </a:srgbClr>
+                  </a:outerShdw>
+                </a:effectLst>
+              </a:rPr>
               <a:t>downvote</a:t>
             </a:r>
             <a:r>
-              <a:rPr lang="en-US" dirty="0" smtClean="0"/>
+              <a:rPr lang="en-US" dirty="0" smtClean="0">
+                <a:solidFill>
+                  <a:schemeClr val="bg1"/>
+                </a:solidFill>
+                <a:effectLst>
+                  <a:outerShdw blurRad="38100" dist="38100" dir="2700000" algn="tl">
+                    <a:srgbClr val="000000">
+                      <a:alpha val="43137"/>
+                    </a:srgbClr>
+                  </a:outerShdw>
+                </a:effectLst>
+              </a:rPr>
               <a:t> “</a:t>
             </a:r>
             <a:r>
               <a:rPr lang="en-US" dirty="0" smtClean="0">
+                <a:solidFill>
+                  <a:schemeClr val="bg1"/>
+                </a:solidFill>
+                <a:effectLst>
+                  <a:outerShdw blurRad="38100" dist="38100" dir="2700000" algn="tl">
+                    <a:srgbClr val="000000">
+                      <a:alpha val="43137"/>
+                    </a:srgbClr>
+                  </a:outerShdw>
+                </a:effectLst>
                 <a:latin typeface="Orbitron" panose="02000000000000000000" pitchFamily="2" charset="0"/>
               </a:rPr>
               <a:t>Pushes</a:t>
             </a:r>
             <a:r>
-              <a:rPr lang="en-US" dirty="0" smtClean="0"/>
+              <a:rPr lang="en-US" dirty="0" smtClean="0">
+                <a:solidFill>
+                  <a:schemeClr val="bg1"/>
+                </a:solidFill>
+                <a:effectLst>
+                  <a:outerShdw blurRad="38100" dist="38100" dir="2700000" algn="tl">
+                    <a:srgbClr val="000000">
+                      <a:alpha val="43137"/>
+                    </a:srgbClr>
+                  </a:outerShdw>
+                </a:effectLst>
+              </a:rPr>
               <a:t>” they like or dislike, contributing to the user’s score.</a:t>
             </a:r>
           </a:p>
           <a:p>
-            <a:endParaRPr lang="en-US" dirty="0" smtClean="0"/>
-          </a:p>
-          <a:p>
-            <a:r>
-              <a:rPr lang="en-US" dirty="0" smtClean="0"/>
+            <a:endParaRPr lang="en-US" dirty="0" smtClean="0">
+              <a:solidFill>
+                <a:schemeClr val="bg1"/>
+              </a:solidFill>
+              <a:effectLst>
+                <a:outerShdw blurRad="38100" dist="38100" dir="2700000" algn="tl">
+                  <a:srgbClr val="000000">
+                    <a:alpha val="43137"/>
+                  </a:srgbClr>
+                </a:outerShdw>
+              </a:effectLst>
+            </a:endParaRPr>
+          </a:p>
+          <a:p>
+            <a:r>
+              <a:rPr lang="en-US" dirty="0" smtClean="0">
+                <a:solidFill>
+                  <a:schemeClr val="bg1"/>
+                </a:solidFill>
+                <a:effectLst>
+                  <a:outerShdw blurRad="38100" dist="38100" dir="2700000" algn="tl">
+                    <a:srgbClr val="000000">
+                      <a:alpha val="43137"/>
+                    </a:srgbClr>
+                  </a:outerShdw>
+                </a:effectLst>
+              </a:rPr>
               <a:t>“</a:t>
             </a:r>
             <a:r>
               <a:rPr lang="en-US" dirty="0" smtClean="0">
+                <a:solidFill>
+                  <a:schemeClr val="bg1"/>
+                </a:solidFill>
+                <a:effectLst>
+                  <a:outerShdw blurRad="38100" dist="38100" dir="2700000" algn="tl">
+                    <a:srgbClr val="000000">
+                      <a:alpha val="43137"/>
+                    </a:srgbClr>
+                  </a:outerShdw>
+                </a:effectLst>
                 <a:latin typeface="Orbitron" panose="02000000000000000000" pitchFamily="2" charset="0"/>
               </a:rPr>
               <a:t>Stacks</a:t>
             </a:r>
             <a:r>
-              <a:rPr lang="en-US" dirty="0" smtClean="0"/>
+              <a:rPr lang="en-US" dirty="0" smtClean="0">
+                <a:solidFill>
+                  <a:schemeClr val="bg1"/>
+                </a:solidFill>
+                <a:effectLst>
+                  <a:outerShdw blurRad="38100" dist="38100" dir="2700000" algn="tl">
+                    <a:srgbClr val="000000">
+                      <a:alpha val="43137"/>
+                    </a:srgbClr>
+                  </a:outerShdw>
+                </a:effectLst>
+              </a:rPr>
               <a:t>” will contain live locational content which offers unique interactions with nearby users which can foster relevant and unique content.</a:t>
             </a:r>
-            <a:endParaRPr lang="en-US" dirty="0"/>
+            <a:endParaRPr lang="en-US" dirty="0">
+              <a:solidFill>
+                <a:schemeClr val="bg1"/>
+              </a:solidFill>
+              <a:effectLst>
+                <a:outerShdw blurRad="38100" dist="38100" dir="2700000" algn="tl">
+                  <a:srgbClr val="000000">
+                    <a:alpha val="43137"/>
+                  </a:srgbClr>
+                </a:outerShdw>
+              </a:effectLst>
+            </a:endParaRPr>
           </a:p>
         </p:txBody>
       </p:sp>
@@ -3333,6 +3759,16 @@
   <p:clrMapOvr>
     <a:masterClrMapping/>
   </p:clrMapOvr>
+  <p:transition spd="slow">
+    <p:push dir="u"/>
+  </p:transition>
+  <p:timing>
+    <p:tnLst>
+      <p:par>
+        <p:cTn id="1" dur="indefinite" restart="never" nodeType="tmRoot"/>
+      </p:par>
+    </p:tnLst>
+  </p:timing>
 </p:sld>
 </file>
 
@@ -3369,10 +3805,34 @@
           <a:lstStyle/>
           <a:p>
             <a:r>
-              <a:rPr lang="en-US" dirty="0" smtClean="0"/>
+              <a:rPr lang="en-US" dirty="0" smtClean="0">
+                <a:solidFill>
+                  <a:schemeClr val="bg1"/>
+                </a:solidFill>
+                <a:effectLst>
+                  <a:outerShdw blurRad="38100" dist="38100" dir="2700000" algn="tl">
+                    <a:srgbClr val="000000">
+                      <a:alpha val="43137"/>
+                    </a:srgbClr>
+                  </a:outerShdw>
+                </a:effectLst>
+                <a:latin typeface="Orbitron" panose="02000000000000000000" pitchFamily="2" charset="0"/>
+              </a:rPr>
               <a:t>Target User Base</a:t>
             </a:r>
-            <a:endParaRPr lang="en-US" dirty="0"/>
+            <a:endParaRPr lang="en-US" dirty="0">
+              <a:solidFill>
+                <a:schemeClr val="bg1"/>
+              </a:solidFill>
+              <a:effectLst>
+                <a:outerShdw blurRad="38100" dist="38100" dir="2700000" algn="tl">
+                  <a:srgbClr val="000000">
+                    <a:alpha val="43137"/>
+                  </a:srgbClr>
+                </a:outerShdw>
+              </a:effectLst>
+              <a:latin typeface="Orbitron" panose="02000000000000000000" pitchFamily="2" charset="0"/>
+            </a:endParaRPr>
           </a:p>
         </p:txBody>
       </p:sp>
@@ -3392,42 +3852,125 @@
           <a:lstStyle/>
           <a:p>
             <a:r>
-              <a:rPr lang="en-US" dirty="0" smtClean="0"/>
+              <a:rPr lang="en-US" dirty="0" smtClean="0">
+                <a:solidFill>
+                  <a:schemeClr val="bg1"/>
+                </a:solidFill>
+                <a:effectLst>
+                  <a:outerShdw blurRad="38100" dist="38100" dir="2700000" algn="tl">
+                    <a:srgbClr val="000000">
+                      <a:alpha val="43137"/>
+                    </a:srgbClr>
+                  </a:outerShdw>
+                </a:effectLst>
+              </a:rPr>
               <a:t>Ages 16-30</a:t>
             </a:r>
           </a:p>
           <a:p>
-            <a:endParaRPr lang="en-US" dirty="0"/>
-          </a:p>
-          <a:p>
-            <a:r>
-              <a:rPr lang="en-US" dirty="0" smtClean="0"/>
+            <a:endParaRPr lang="en-US" dirty="0">
+              <a:solidFill>
+                <a:schemeClr val="bg1"/>
+              </a:solidFill>
+              <a:effectLst>
+                <a:outerShdw blurRad="38100" dist="38100" dir="2700000" algn="tl">
+                  <a:srgbClr val="000000">
+                    <a:alpha val="43137"/>
+                  </a:srgbClr>
+                </a:outerShdw>
+              </a:effectLst>
+            </a:endParaRPr>
+          </a:p>
+          <a:p>
+            <a:r>
+              <a:rPr lang="en-US" dirty="0" smtClean="0">
+                <a:solidFill>
+                  <a:schemeClr val="bg1"/>
+                </a:solidFill>
+                <a:effectLst>
+                  <a:outerShdw blurRad="38100" dist="38100" dir="2700000" algn="tl">
+                    <a:srgbClr val="000000">
+                      <a:alpha val="43137"/>
+                    </a:srgbClr>
+                  </a:outerShdw>
+                </a:effectLst>
+              </a:rPr>
               <a:t>Users in socially active environment</a:t>
             </a:r>
           </a:p>
           <a:p>
-            <a:endParaRPr lang="en-US" dirty="0"/>
-          </a:p>
-          <a:p>
-            <a:r>
-              <a:rPr lang="en-US" dirty="0" smtClean="0"/>
-              <a:t>People seeking unique and </a:t>
-            </a:r>
-            <a:r>
-              <a:rPr lang="en-US" smtClean="0"/>
-              <a:t>interactive entertainment</a:t>
-            </a:r>
-            <a:endParaRPr lang="en-US" dirty="0" smtClean="0"/>
-          </a:p>
-          <a:p>
-            <a:endParaRPr lang="en-US" dirty="0"/>
-          </a:p>
-          <a:p>
-            <a:r>
-              <a:rPr lang="en-US" dirty="0" smtClean="0"/>
+            <a:endParaRPr lang="en-US" dirty="0">
+              <a:solidFill>
+                <a:schemeClr val="bg1"/>
+              </a:solidFill>
+              <a:effectLst>
+                <a:outerShdw blurRad="38100" dist="38100" dir="2700000" algn="tl">
+                  <a:srgbClr val="000000">
+                    <a:alpha val="43137"/>
+                  </a:srgbClr>
+                </a:outerShdw>
+              </a:effectLst>
+            </a:endParaRPr>
+          </a:p>
+          <a:p>
+            <a:r>
+              <a:rPr lang="en-US" dirty="0" smtClean="0">
+                <a:solidFill>
+                  <a:schemeClr val="bg1"/>
+                </a:solidFill>
+                <a:effectLst>
+                  <a:outerShdw blurRad="38100" dist="38100" dir="2700000" algn="tl">
+                    <a:srgbClr val="000000">
+                      <a:alpha val="43137"/>
+                    </a:srgbClr>
+                  </a:outerShdw>
+                </a:effectLst>
+              </a:rPr>
+              <a:t>People seeking unique and interactive entertainment</a:t>
+            </a:r>
+          </a:p>
+          <a:p>
+            <a:endParaRPr lang="en-US" dirty="0">
+              <a:solidFill>
+                <a:schemeClr val="bg1"/>
+              </a:solidFill>
+              <a:effectLst>
+                <a:outerShdw blurRad="38100" dist="38100" dir="2700000" algn="tl">
+                  <a:srgbClr val="000000">
+                    <a:alpha val="43137"/>
+                  </a:srgbClr>
+                </a:outerShdw>
+              </a:effectLst>
+            </a:endParaRPr>
+          </a:p>
+          <a:p>
+            <a:r>
+              <a:rPr lang="en-US" dirty="0" smtClean="0">
+                <a:solidFill>
+                  <a:schemeClr val="bg1"/>
+                </a:solidFill>
+                <a:effectLst>
+                  <a:outerShdw blurRad="38100" dist="38100" dir="2700000" algn="tl">
+                    <a:srgbClr val="000000">
+                      <a:alpha val="43137"/>
+                    </a:srgbClr>
+                  </a:outerShdw>
+                </a:effectLst>
+              </a:rPr>
               <a:t>People active in social media</a:t>
             </a:r>
-            <a:endParaRPr lang="en-US" dirty="0"/>
+            <a:endParaRPr lang="en-US" dirty="0">
+              <a:solidFill>
+                <a:schemeClr val="bg1"/>
+              </a:solidFill>
+              <a:effectLst>
+                <a:outerShdw blurRad="38100" dist="38100" dir="2700000" algn="tl">
+                  <a:srgbClr val="000000">
+                    <a:alpha val="43137"/>
+                  </a:srgbClr>
+                </a:outerShdw>
+              </a:effectLst>
+            </a:endParaRPr>
           </a:p>
         </p:txBody>
       </p:sp>
@@ -3441,13 +3984,23 @@
   <p:clrMapOvr>
     <a:masterClrMapping/>
   </p:clrMapOvr>
+  <p:transition spd="slow">
+    <p:push dir="u"/>
+  </p:transition>
+  <p:timing>
+    <p:tnLst>
+      <p:par>
+        <p:cTn id="1" dur="indefinite" restart="never" nodeType="tmRoot"/>
+      </p:par>
+    </p:tnLst>
+  </p:timing>
 </p:sld>
 </file>
 
 <file path=ppt/theme/theme1.xml><?xml version="1.0" encoding="utf-8"?>
 <a:theme xmlns:a="http://schemas.openxmlformats.org/drawingml/2006/main" name="Office Theme">
   <a:themeElements>
-    <a:clrScheme name="Office">
+    <a:clrScheme name="Office Theme">
       <a:dk1>
         <a:sysClr val="windowText" lastClr="000000"/>
       </a:dk1>
@@ -3485,7 +4038,7 @@
         <a:srgbClr val="954F72"/>
       </a:folHlink>
     </a:clrScheme>
-    <a:fontScheme name="Office">
+    <a:fontScheme name="Office Theme">
       <a:majorFont>
         <a:latin typeface="Calibri Light" panose="020F0302020204030204"/>
         <a:ea typeface=""/>
@@ -3557,7 +4110,7 @@
         <a:font script="Geor" typeface="Sylfaen"/>
       </a:minorFont>
     </a:fontScheme>
-    <a:fmtScheme name="Office">
+    <a:fmtScheme name="Office Theme">
       <a:fillStyleLst>
         <a:solidFill>
           <a:schemeClr val="phClr"/>

</xml_diff>